<commit_message>
Added Sprint 7 slides
</commit_message>
<xml_diff>
--- a/Scrumtastic/Sprint4/Sprint4.pptx
+++ b/Scrumtastic/Sprint4/Sprint4.pptx
@@ -3463,7 +3463,7 @@
           <a:p>
             <a:fld id="{419EF442-84AA-4C28-BD5A-3E28E35E5CBE}" type="datetimeFigureOut">
               <a:rPr lang="it-IT" smtClean="0"/>
-              <a:t>08/01/2024</a:t>
+              <a:t>19/02/2024</a:t>
             </a:fld>
             <a:endParaRPr lang="it-IT"/>
           </a:p>
@@ -4803,7 +4803,7 @@
           <a:p>
             <a:fld id="{5151ADD4-8A0E-493F-80BE-9838D3C137E6}" type="datetimeFigureOut">
               <a:rPr lang="it-IT" smtClean="0"/>
-              <a:t>08/01/2024</a:t>
+              <a:t>19/02/2024</a:t>
             </a:fld>
             <a:endParaRPr lang="it-IT"/>
           </a:p>
@@ -5003,7 +5003,7 @@
           <a:p>
             <a:fld id="{5151ADD4-8A0E-493F-80BE-9838D3C137E6}" type="datetimeFigureOut">
               <a:rPr lang="it-IT" smtClean="0"/>
-              <a:t>08/01/2024</a:t>
+              <a:t>19/02/2024</a:t>
             </a:fld>
             <a:endParaRPr lang="it-IT"/>
           </a:p>
@@ -5213,7 +5213,7 @@
           <a:p>
             <a:fld id="{5151ADD4-8A0E-493F-80BE-9838D3C137E6}" type="datetimeFigureOut">
               <a:rPr lang="it-IT" smtClean="0"/>
-              <a:t>08/01/2024</a:t>
+              <a:t>19/02/2024</a:t>
             </a:fld>
             <a:endParaRPr lang="it-IT"/>
           </a:p>
@@ -5413,7 +5413,7 @@
           <a:p>
             <a:fld id="{5151ADD4-8A0E-493F-80BE-9838D3C137E6}" type="datetimeFigureOut">
               <a:rPr lang="it-IT" smtClean="0"/>
-              <a:t>08/01/2024</a:t>
+              <a:t>19/02/2024</a:t>
             </a:fld>
             <a:endParaRPr lang="it-IT"/>
           </a:p>
@@ -5689,7 +5689,7 @@
           <a:p>
             <a:fld id="{5151ADD4-8A0E-493F-80BE-9838D3C137E6}" type="datetimeFigureOut">
               <a:rPr lang="it-IT" smtClean="0"/>
-              <a:t>08/01/2024</a:t>
+              <a:t>19/02/2024</a:t>
             </a:fld>
             <a:endParaRPr lang="it-IT"/>
           </a:p>
@@ -5957,7 +5957,7 @@
           <a:p>
             <a:fld id="{5151ADD4-8A0E-493F-80BE-9838D3C137E6}" type="datetimeFigureOut">
               <a:rPr lang="it-IT" smtClean="0"/>
-              <a:t>08/01/2024</a:t>
+              <a:t>19/02/2024</a:t>
             </a:fld>
             <a:endParaRPr lang="it-IT"/>
           </a:p>
@@ -6372,7 +6372,7 @@
           <a:p>
             <a:fld id="{5151ADD4-8A0E-493F-80BE-9838D3C137E6}" type="datetimeFigureOut">
               <a:rPr lang="it-IT" smtClean="0"/>
-              <a:t>08/01/2024</a:t>
+              <a:t>19/02/2024</a:t>
             </a:fld>
             <a:endParaRPr lang="it-IT"/>
           </a:p>
@@ -6514,7 +6514,7 @@
           <a:p>
             <a:fld id="{5151ADD4-8A0E-493F-80BE-9838D3C137E6}" type="datetimeFigureOut">
               <a:rPr lang="it-IT" smtClean="0"/>
-              <a:t>08/01/2024</a:t>
+              <a:t>19/02/2024</a:t>
             </a:fld>
             <a:endParaRPr lang="it-IT"/>
           </a:p>
@@ -6627,7 +6627,7 @@
           <a:p>
             <a:fld id="{5151ADD4-8A0E-493F-80BE-9838D3C137E6}" type="datetimeFigureOut">
               <a:rPr lang="it-IT" smtClean="0"/>
-              <a:t>08/01/2024</a:t>
+              <a:t>19/02/2024</a:t>
             </a:fld>
             <a:endParaRPr lang="it-IT"/>
           </a:p>
@@ -6940,7 +6940,7 @@
           <a:p>
             <a:fld id="{5151ADD4-8A0E-493F-80BE-9838D3C137E6}" type="datetimeFigureOut">
               <a:rPr lang="it-IT" smtClean="0"/>
-              <a:t>08/01/2024</a:t>
+              <a:t>19/02/2024</a:t>
             </a:fld>
             <a:endParaRPr lang="it-IT"/>
           </a:p>
@@ -7229,7 +7229,7 @@
           <a:p>
             <a:fld id="{5151ADD4-8A0E-493F-80BE-9838D3C137E6}" type="datetimeFigureOut">
               <a:rPr lang="it-IT" smtClean="0"/>
-              <a:t>08/01/2024</a:t>
+              <a:t>19/02/2024</a:t>
             </a:fld>
             <a:endParaRPr lang="it-IT"/>
           </a:p>
@@ -7472,7 +7472,7 @@
           <a:p>
             <a:fld id="{5151ADD4-8A0E-493F-80BE-9838D3C137E6}" type="datetimeFigureOut">
               <a:rPr lang="it-IT" smtClean="0"/>
-              <a:t>08/01/2024</a:t>
+              <a:t>19/02/2024</a:t>
             </a:fld>
             <a:endParaRPr lang="it-IT"/>
           </a:p>
@@ -20396,7 +20396,7 @@
                 <a:ea typeface="Calibri Light" panose="020F0302020204030204" pitchFamily="34" charset="0"/>
                 <a:cs typeface="Calibri Light" panose="020F0302020204030204" pitchFamily="34" charset="0"/>
               </a:rPr>
-              <a:t>Inserimento Servizi (#user story #74)</a:t>
+              <a:t>Inserimento Servizi (user story #74)</a:t>
             </a:r>
           </a:p>
         </p:txBody>

</xml_diff>